<commit_message>
updated Word, PDF and PPT files
</commit_message>
<xml_diff>
--- a/03/03_eloadas_HTTP_protokollok_fejlodese.pptx
+++ b/03/03_eloadas_HTTP_protokollok_fejlodese.pptx
@@ -213,7 +213,7 @@
           <a:p>
             <a:fld id="{4C482E4E-5CEC-44A9-BF2B-512FB3B5604F}" type="datetimeFigureOut">
               <a:rPr lang="en-US" smtClean="0"/>
-              <a:t>1/12/2026</a:t>
+              <a:t>2/9/2026</a:t>
             </a:fld>
             <a:endParaRPr lang="en-US"/>
           </a:p>
@@ -990,7 +990,7 @@
             </a:r>
             <a:r>
               <a:rPr lang="hu-HU" dirty="0"/>
-              <a:t> mint a HTTP/1.1. és HTTP/2 esetén</a:t>
+              <a:t> mint a HTTP/1.1 és HTTP/2 esetén</a:t>
             </a:r>
             <a:r>
               <a:rPr lang="en-US" dirty="0"/>
@@ -6676,7 +6676,7 @@
           <a:p>
             <a:fld id="{E80C50CD-E178-4744-9B35-B2F624D6C5E9}" type="datetimeFigureOut">
               <a:rPr lang="en-US" smtClean="0"/>
-              <a:t>1/12/2026</a:t>
+              <a:t>2/9/2026</a:t>
             </a:fld>
             <a:endParaRPr lang="en-US"/>
           </a:p>
@@ -6874,7 +6874,7 @@
           <a:p>
             <a:fld id="{E80C50CD-E178-4744-9B35-B2F624D6C5E9}" type="datetimeFigureOut">
               <a:rPr lang="en-US" smtClean="0"/>
-              <a:t>1/12/2026</a:t>
+              <a:t>2/9/2026</a:t>
             </a:fld>
             <a:endParaRPr lang="en-US"/>
           </a:p>
@@ -7082,7 +7082,7 @@
           <a:p>
             <a:fld id="{E80C50CD-E178-4744-9B35-B2F624D6C5E9}" type="datetimeFigureOut">
               <a:rPr lang="en-US" smtClean="0"/>
-              <a:t>1/12/2026</a:t>
+              <a:t>2/9/2026</a:t>
             </a:fld>
             <a:endParaRPr lang="en-US"/>
           </a:p>
@@ -7332,7 +7332,7 @@
           <a:p>
             <a:fld id="{E80C50CD-E178-4744-9B35-B2F624D6C5E9}" type="datetimeFigureOut">
               <a:rPr lang="en-US" smtClean="0"/>
-              <a:t>1/12/2026</a:t>
+              <a:t>2/9/2026</a:t>
             </a:fld>
             <a:endParaRPr lang="en-US"/>
           </a:p>
@@ -7611,7 +7611,7 @@
           <a:p>
             <a:fld id="{E80C50CD-E178-4744-9B35-B2F624D6C5E9}" type="datetimeFigureOut">
               <a:rPr lang="en-US" smtClean="0"/>
-              <a:t>1/12/2026</a:t>
+              <a:t>2/9/2026</a:t>
             </a:fld>
             <a:endParaRPr lang="en-US"/>
           </a:p>
@@ -7928,7 +7928,7 @@
           <a:p>
             <a:fld id="{E80C50CD-E178-4744-9B35-B2F624D6C5E9}" type="datetimeFigureOut">
               <a:rPr lang="en-US" smtClean="0"/>
-              <a:t>1/12/2026</a:t>
+              <a:t>2/9/2026</a:t>
             </a:fld>
             <a:endParaRPr lang="en-US"/>
           </a:p>
@@ -8344,7 +8344,7 @@
           <a:p>
             <a:fld id="{E80C50CD-E178-4744-9B35-B2F624D6C5E9}" type="datetimeFigureOut">
               <a:rPr lang="en-US" smtClean="0"/>
-              <a:t>1/12/2026</a:t>
+              <a:t>2/9/2026</a:t>
             </a:fld>
             <a:endParaRPr lang="en-US"/>
           </a:p>
@@ -8485,7 +8485,7 @@
           <a:p>
             <a:fld id="{E80C50CD-E178-4744-9B35-B2F624D6C5E9}" type="datetimeFigureOut">
               <a:rPr lang="en-US" smtClean="0"/>
-              <a:t>1/12/2026</a:t>
+              <a:t>2/9/2026</a:t>
             </a:fld>
             <a:endParaRPr lang="en-US"/>
           </a:p>
@@ -8598,7 +8598,7 @@
           <a:p>
             <a:fld id="{E80C50CD-E178-4744-9B35-B2F624D6C5E9}" type="datetimeFigureOut">
               <a:rPr lang="en-US" smtClean="0"/>
-              <a:t>1/12/2026</a:t>
+              <a:t>2/9/2026</a:t>
             </a:fld>
             <a:endParaRPr lang="en-US"/>
           </a:p>
@@ -8915,7 +8915,7 @@
           <a:p>
             <a:fld id="{E80C50CD-E178-4744-9B35-B2F624D6C5E9}" type="datetimeFigureOut">
               <a:rPr lang="en-US" smtClean="0"/>
-              <a:t>1/12/2026</a:t>
+              <a:t>2/9/2026</a:t>
             </a:fld>
             <a:endParaRPr lang="en-US"/>
           </a:p>
@@ -9207,7 +9207,7 @@
           <a:p>
             <a:fld id="{E80C50CD-E178-4744-9B35-B2F624D6C5E9}" type="datetimeFigureOut">
               <a:rPr lang="en-US" smtClean="0"/>
-              <a:t>1/12/2026</a:t>
+              <a:t>2/9/2026</a:t>
             </a:fld>
             <a:endParaRPr lang="en-US"/>
           </a:p>
@@ -9447,7 +9447,7 @@
             <a:fld id="{E80C50CD-E178-4744-9B35-B2F624D6C5E9}" type="datetimeFigureOut">
               <a:rPr lang="en-US" smtClean="0"/>
               <a:pPr/>
-              <a:t>1/12/2026</a:t>
+              <a:t>2/9/2026</a:t>
             </a:fld>
             <a:endParaRPr lang="en-US"/>
           </a:p>

</xml_diff>

<commit_message>
updated PDF, Word and PPT files for 03 and 04 presentations.
</commit_message>
<xml_diff>
--- a/03/03_eloadas_HTTP_protokollok_fejlodese.pptx
+++ b/03/03_eloadas_HTTP_protokollok_fejlodese.pptx
@@ -213,7 +213,7 @@
           <a:p>
             <a:fld id="{4C482E4E-5CEC-44A9-BF2B-512FB3B5604F}" type="datetimeFigureOut">
               <a:rPr lang="en-US" smtClean="0"/>
-              <a:t>2/9/2026</a:t>
+              <a:t>2/10/2026</a:t>
             </a:fld>
             <a:endParaRPr lang="en-US"/>
           </a:p>
@@ -6676,7 +6676,7 @@
           <a:p>
             <a:fld id="{E80C50CD-E178-4744-9B35-B2F624D6C5E9}" type="datetimeFigureOut">
               <a:rPr lang="en-US" smtClean="0"/>
-              <a:t>2/9/2026</a:t>
+              <a:t>2/10/2026</a:t>
             </a:fld>
             <a:endParaRPr lang="en-US"/>
           </a:p>
@@ -6874,7 +6874,7 @@
           <a:p>
             <a:fld id="{E80C50CD-E178-4744-9B35-B2F624D6C5E9}" type="datetimeFigureOut">
               <a:rPr lang="en-US" smtClean="0"/>
-              <a:t>2/9/2026</a:t>
+              <a:t>2/10/2026</a:t>
             </a:fld>
             <a:endParaRPr lang="en-US"/>
           </a:p>
@@ -7082,7 +7082,7 @@
           <a:p>
             <a:fld id="{E80C50CD-E178-4744-9B35-B2F624D6C5E9}" type="datetimeFigureOut">
               <a:rPr lang="en-US" smtClean="0"/>
-              <a:t>2/9/2026</a:t>
+              <a:t>2/10/2026</a:t>
             </a:fld>
             <a:endParaRPr lang="en-US"/>
           </a:p>
@@ -7332,7 +7332,7 @@
           <a:p>
             <a:fld id="{E80C50CD-E178-4744-9B35-B2F624D6C5E9}" type="datetimeFigureOut">
               <a:rPr lang="en-US" smtClean="0"/>
-              <a:t>2/9/2026</a:t>
+              <a:t>2/10/2026</a:t>
             </a:fld>
             <a:endParaRPr lang="en-US"/>
           </a:p>
@@ -7611,7 +7611,7 @@
           <a:p>
             <a:fld id="{E80C50CD-E178-4744-9B35-B2F624D6C5E9}" type="datetimeFigureOut">
               <a:rPr lang="en-US" smtClean="0"/>
-              <a:t>2/9/2026</a:t>
+              <a:t>2/10/2026</a:t>
             </a:fld>
             <a:endParaRPr lang="en-US"/>
           </a:p>
@@ -7928,7 +7928,7 @@
           <a:p>
             <a:fld id="{E80C50CD-E178-4744-9B35-B2F624D6C5E9}" type="datetimeFigureOut">
               <a:rPr lang="en-US" smtClean="0"/>
-              <a:t>2/9/2026</a:t>
+              <a:t>2/10/2026</a:t>
             </a:fld>
             <a:endParaRPr lang="en-US"/>
           </a:p>
@@ -8344,7 +8344,7 @@
           <a:p>
             <a:fld id="{E80C50CD-E178-4744-9B35-B2F624D6C5E9}" type="datetimeFigureOut">
               <a:rPr lang="en-US" smtClean="0"/>
-              <a:t>2/9/2026</a:t>
+              <a:t>2/10/2026</a:t>
             </a:fld>
             <a:endParaRPr lang="en-US"/>
           </a:p>
@@ -8485,7 +8485,7 @@
           <a:p>
             <a:fld id="{E80C50CD-E178-4744-9B35-B2F624D6C5E9}" type="datetimeFigureOut">
               <a:rPr lang="en-US" smtClean="0"/>
-              <a:t>2/9/2026</a:t>
+              <a:t>2/10/2026</a:t>
             </a:fld>
             <a:endParaRPr lang="en-US"/>
           </a:p>
@@ -8598,7 +8598,7 @@
           <a:p>
             <a:fld id="{E80C50CD-E178-4744-9B35-B2F624D6C5E9}" type="datetimeFigureOut">
               <a:rPr lang="en-US" smtClean="0"/>
-              <a:t>2/9/2026</a:t>
+              <a:t>2/10/2026</a:t>
             </a:fld>
             <a:endParaRPr lang="en-US"/>
           </a:p>
@@ -8915,7 +8915,7 @@
           <a:p>
             <a:fld id="{E80C50CD-E178-4744-9B35-B2F624D6C5E9}" type="datetimeFigureOut">
               <a:rPr lang="en-US" smtClean="0"/>
-              <a:t>2/9/2026</a:t>
+              <a:t>2/10/2026</a:t>
             </a:fld>
             <a:endParaRPr lang="en-US"/>
           </a:p>
@@ -9207,7 +9207,7 @@
           <a:p>
             <a:fld id="{E80C50CD-E178-4744-9B35-B2F624D6C5E9}" type="datetimeFigureOut">
               <a:rPr lang="en-US" smtClean="0"/>
-              <a:t>2/9/2026</a:t>
+              <a:t>2/10/2026</a:t>
             </a:fld>
             <a:endParaRPr lang="en-US"/>
           </a:p>
@@ -9447,7 +9447,7 @@
             <a:fld id="{E80C50CD-E178-4744-9B35-B2F624D6C5E9}" type="datetimeFigureOut">
               <a:rPr lang="en-US" smtClean="0"/>
               <a:pPr/>
-              <a:t>2/9/2026</a:t>
+              <a:t>2/10/2026</a:t>
             </a:fld>
             <a:endParaRPr lang="en-US"/>
           </a:p>
@@ -10957,22 +10957,29 @@
               <a:t>• </a:t>
             </a:r>
             <a:r>
-              <a:rPr lang="en-US" sz="2400" dirty="0" err="1"/>
+              <a:rPr lang="en-US" sz="2400" b="1" dirty="0" err="1"/>
               <a:t>Beépített</a:t>
             </a:r>
             <a:r>
+              <a:rPr lang="en-US" sz="2400" b="1" dirty="0"/>
+              <a:t> </a:t>
+            </a:r>
+            <a:r>
+              <a:rPr lang="en-US" sz="2400" b="1" dirty="0" err="1"/>
+              <a:t>titkosítás</a:t>
+            </a:r>
+            <a:r>
+              <a:rPr lang="en-US" sz="2400" b="1" dirty="0"/>
+              <a:t> </a:t>
+            </a:r>
+            <a:r>
               <a:rPr lang="en-US" sz="2400" dirty="0"/>
-              <a:t> </a:t>
-            </a:r>
-            <a:r>
-              <a:rPr lang="en-US" sz="2400" dirty="0" err="1"/>
-              <a:t>titkosítás</a:t>
-            </a:r>
-            <a:r>
-              <a:rPr lang="en-US" sz="2400" dirty="0"/>
-              <a:t> (TLS 1.3)</a:t>
-            </a:r>
-            <a:endParaRPr lang="hu-HU" sz="2400" dirty="0"/>
+              <a:t>(TLS 1.3)</a:t>
+            </a:r>
+            <a:r>
+              <a:rPr lang="hu-HU" sz="2400" dirty="0"/>
+              <a:t>, ami kötelező</a:t>
+            </a:r>
           </a:p>
           <a:p>
             <a:pPr marL="0" indent="0">
@@ -10986,11 +10993,23 @@
             </a:pPr>
             <a:r>
               <a:rPr lang="en-US" sz="2400" dirty="0"/>
-              <a:t>• Multiplexing</a:t>
+              <a:t>• </a:t>
+            </a:r>
+            <a:r>
+              <a:rPr lang="en-US" sz="2400" b="1" dirty="0"/>
+              <a:t>Multiplexing</a:t>
             </a:r>
             <a:r>
               <a:rPr lang="hu-HU" sz="2400" dirty="0"/>
-              <a:t> és streaming támogatása</a:t>
+              <a:t> és </a:t>
+            </a:r>
+            <a:r>
+              <a:rPr lang="hu-HU" sz="2400" b="1" dirty="0"/>
+              <a:t>streaming</a:t>
+            </a:r>
+            <a:r>
+              <a:rPr lang="hu-HU" sz="2400" dirty="0"/>
+              <a:t> támogatása</a:t>
             </a:r>
           </a:p>
           <a:p>
@@ -11158,7 +11177,15 @@
             </a:br>
             <a:r>
               <a:rPr lang="en-US" sz="2400" dirty="0"/>
-              <a:t>• Minden stream </a:t>
+              <a:t>• Minden </a:t>
+            </a:r>
+            <a:r>
+              <a:rPr lang="en-US" sz="2400" b="1" dirty="0"/>
+              <a:t>stream</a:t>
+            </a:r>
+            <a:r>
+              <a:rPr lang="en-US" sz="2400" dirty="0"/>
+              <a:t> </a:t>
             </a:r>
             <a:r>
               <a:rPr lang="en-US" sz="2400" dirty="0" err="1"/>
@@ -11174,7 +11201,11 @@
             </a:r>
             <a:r>
               <a:rPr lang="hu-HU" sz="2400" dirty="0"/>
-              <a:t> és független</a:t>
+              <a:t> és </a:t>
+            </a:r>
+            <a:r>
+              <a:rPr lang="hu-HU" sz="2400" b="1" dirty="0"/>
+              <a:t>független</a:t>
             </a:r>
           </a:p>
           <a:p>
@@ -11192,11 +11223,11 @@
               <a:t>• </a:t>
             </a:r>
             <a:r>
-              <a:rPr lang="en-US" sz="2400" dirty="0" err="1"/>
+              <a:rPr lang="en-US" sz="2400" b="1" dirty="0" err="1"/>
               <a:t>Nincs</a:t>
             </a:r>
             <a:r>
-              <a:rPr lang="en-US" sz="2400" dirty="0"/>
+              <a:rPr lang="en-US" sz="2400" b="1" dirty="0"/>
               <a:t> TCP-level HOL blocking</a:t>
             </a:r>
             <a:br>
@@ -11523,14 +11554,30 @@
             </a:pPr>
             <a:r>
               <a:rPr lang="hu-HU" sz="2400" dirty="0"/>
-              <a:t>• Egymástól független és párhuzamos </a:t>
-            </a:r>
-            <a:r>
-              <a:rPr lang="hu-HU" sz="2400" dirty="0" err="1"/>
+              <a:t>• Egymástól </a:t>
+            </a:r>
+            <a:r>
+              <a:rPr lang="hu-HU" sz="2400" b="1" dirty="0"/>
+              <a:t>független</a:t>
+            </a:r>
+            <a:r>
+              <a:rPr lang="hu-HU" sz="2400" dirty="0"/>
+              <a:t> és </a:t>
+            </a:r>
+            <a:r>
+              <a:rPr lang="hu-HU" sz="2400" b="1" dirty="0"/>
+              <a:t>párhuzamos</a:t>
+            </a:r>
+            <a:r>
+              <a:rPr lang="hu-HU" sz="2400" dirty="0"/>
+              <a:t> </a:t>
+            </a:r>
+            <a:r>
+              <a:rPr lang="hu-HU" sz="2400" b="1" dirty="0" err="1"/>
               <a:t>stream</a:t>
             </a:r>
             <a:r>
-              <a:rPr lang="hu-HU" sz="2400" dirty="0"/>
+              <a:rPr lang="hu-HU" sz="2400" b="1" dirty="0"/>
               <a:t>-ek</a:t>
             </a:r>
           </a:p>
@@ -11549,7 +11596,7 @@
               <a:t>• </a:t>
             </a:r>
             <a:r>
-              <a:rPr lang="en-US" sz="2400" dirty="0" err="1"/>
+              <a:rPr lang="en-US" sz="2400" b="1" dirty="0" err="1"/>
               <a:t>Gyors</a:t>
             </a:r>
             <a:r>
@@ -11565,10 +11612,14 @@
             </a:br>
             <a:r>
               <a:rPr lang="hu-HU" sz="2400" dirty="0"/>
-              <a:t>• Kevesebb </a:t>
-            </a:r>
-            <a:r>
-              <a:rPr lang="hu-HU" sz="2400" dirty="0" err="1"/>
+              <a:t>• </a:t>
+            </a:r>
+            <a:r>
+              <a:rPr lang="hu-HU" sz="2400" b="1" dirty="0"/>
+              <a:t>Kevesebb </a:t>
+            </a:r>
+            <a:r>
+              <a:rPr lang="hu-HU" sz="2400" b="1" dirty="0" err="1"/>
               <a:t>round-trip</a:t>
             </a:r>
             <a:r>
@@ -11592,7 +11643,15 @@
             </a:br>
             <a:r>
               <a:rPr lang="hu-HU" sz="2400" dirty="0"/>
-              <a:t>• Stabil teljesítmény</a:t>
+              <a:t>• </a:t>
+            </a:r>
+            <a:r>
+              <a:rPr lang="hu-HU" sz="2400" b="1" dirty="0"/>
+              <a:t>Stabil</a:t>
+            </a:r>
+            <a:r>
+              <a:rPr lang="hu-HU" sz="2400" dirty="0"/>
+              <a:t> teljesítmény</a:t>
             </a:r>
           </a:p>
           <a:p>
@@ -11607,7 +11666,15 @@
             </a:pPr>
             <a:r>
               <a:rPr lang="hu-HU" sz="2400" dirty="0"/>
-              <a:t>• Még gyorsabb működés mobil hálózaton</a:t>
+              <a:t>• Még </a:t>
+            </a:r>
+            <a:r>
+              <a:rPr lang="hu-HU" sz="2400" b="1" dirty="0"/>
+              <a:t>gyorsabb</a:t>
+            </a:r>
+            <a:r>
+              <a:rPr lang="hu-HU" sz="2400" dirty="0"/>
+              <a:t> működés mobil hálózaton</a:t>
             </a:r>
             <a:endParaRPr lang="en-US" sz="2400" dirty="0"/>
           </a:p>
@@ -13187,7 +13254,7 @@
               <a:t> </a:t>
             </a:r>
             <a:r>
-              <a:rPr lang="en-US" sz="2400" dirty="0" err="1"/>
+              <a:rPr lang="en-US" sz="2400" b="1" dirty="0" err="1"/>
               <a:t>komplexebbé</a:t>
             </a:r>
             <a:r>
@@ -13203,10 +13270,14 @@
             </a:br>
             <a:r>
               <a:rPr lang="en-US" sz="2400" dirty="0"/>
-              <a:t>• Sok </a:t>
-            </a:r>
-            <a:r>
-              <a:rPr lang="en-US" sz="2400" dirty="0" err="1"/>
+              <a:t>• </a:t>
+            </a:r>
+            <a:r>
+              <a:rPr lang="en-US" sz="2400" b="1" dirty="0"/>
+              <a:t>Sok </a:t>
+            </a:r>
+            <a:r>
+              <a:rPr lang="en-US" sz="2400" b="1" dirty="0" err="1"/>
               <a:t>erőforrás</a:t>
             </a:r>
             <a:r>
@@ -13230,10 +13301,14 @@
             </a:br>
             <a:r>
               <a:rPr lang="en-US" sz="2400" dirty="0"/>
-              <a:t>• Mobil </a:t>
-            </a:r>
-            <a:r>
-              <a:rPr lang="en-US" sz="2400" dirty="0" err="1"/>
+              <a:t>• </a:t>
+            </a:r>
+            <a:r>
+              <a:rPr lang="en-US" sz="2400" b="1" dirty="0"/>
+              <a:t>Mobil </a:t>
+            </a:r>
+            <a:r>
+              <a:rPr lang="en-US" sz="2400" b="1" dirty="0" err="1"/>
               <a:t>kliensek</a:t>
             </a:r>
             <a:r>
@@ -14164,10 +14239,10 @@
               <a:t> </a:t>
             </a:r>
             <a:r>
-              <a:rPr lang="en-US" sz="2400" dirty="0" err="1"/>
+              <a:rPr lang="en-US" sz="2400" b="1" dirty="0" err="1"/>
               <a:t>komplexitása</a:t>
             </a:r>
-            <a:endParaRPr lang="hu-HU" sz="2400" dirty="0"/>
+            <a:endParaRPr lang="hu-HU" sz="2400" b="1" dirty="0"/>
           </a:p>
           <a:p>
             <a:pPr marL="0" indent="0">
@@ -15162,8 +15237,12 @@
               </a:lnSpc>
             </a:pPr>
             <a:r>
+              <a:rPr lang="hu-HU" sz="2400" b="1" dirty="0"/>
+              <a:t>HPACK</a:t>
+            </a:r>
+            <a:r>
               <a:rPr lang="hu-HU" sz="2400" dirty="0"/>
-              <a:t>HPACK: </a:t>
+              <a:t>: </a:t>
             </a:r>
             <a:r>
               <a:rPr lang="hu-HU" sz="2400" dirty="0" err="1"/>
@@ -15190,15 +15269,23 @@
               <a:t>HPACK </a:t>
             </a:r>
             <a:r>
-              <a:rPr lang="en-US" sz="2400" dirty="0" err="1"/>
+              <a:rPr lang="en-US" sz="2400" b="1" dirty="0" err="1"/>
               <a:t>tömöríti</a:t>
             </a:r>
             <a:r>
               <a:rPr lang="en-US" sz="2400" dirty="0"/>
-              <a:t> a </a:t>
-            </a:r>
-            <a:r>
-              <a:rPr lang="en-US" sz="2400" dirty="0" err="1"/>
+              <a:t> </a:t>
+            </a:r>
+            <a:r>
+              <a:rPr lang="en-US" sz="2400" b="1" dirty="0"/>
+              <a:t>a</a:t>
+            </a:r>
+            <a:r>
+              <a:rPr lang="en-US" sz="2400" dirty="0"/>
+              <a:t> </a:t>
+            </a:r>
+            <a:r>
+              <a:rPr lang="en-US" sz="2400" b="1" dirty="0" err="1"/>
               <a:t>fejléceket</a:t>
             </a:r>
             <a:r>
@@ -15226,7 +15313,7 @@
               </a:lnSpc>
             </a:pPr>
             <a:r>
-              <a:rPr lang="hu-HU" sz="2400" dirty="0" err="1"/>
+              <a:rPr lang="hu-HU" sz="2400" b="1" dirty="0" err="1"/>
               <a:t>Stream</a:t>
             </a:r>
             <a:r>
@@ -15234,7 +15321,7 @@
               <a:t> </a:t>
             </a:r>
             <a:r>
-              <a:rPr lang="hu-HU" sz="2400" dirty="0" err="1"/>
+              <a:rPr lang="hu-HU" sz="2400" b="1" dirty="0" err="1"/>
               <a:t>priorítások</a:t>
             </a:r>
             <a:r>
@@ -15249,8 +15336,12 @@
               </a:lnSpc>
             </a:pPr>
             <a:r>
+              <a:rPr lang="en-US" sz="2400" b="1" dirty="0"/>
+              <a:t>Server Push</a:t>
+            </a:r>
+            <a:r>
               <a:rPr lang="en-US" sz="2400" dirty="0"/>
-              <a:t>Server Push: </a:t>
+              <a:t>: </a:t>
             </a:r>
             <a:r>
               <a:rPr lang="en-US" sz="2400" dirty="0" err="1"/>

</xml_diff>